<commit_message>
Updates and app flow views for login phase.
</commit_message>
<xml_diff>
--- a/icons/logo.pptx
+++ b/icons/logo.pptx
@@ -2966,56 +2966,88 @@
           <a:chExt cx="0" cy="0"/>
         </a:xfrm>
       </p:grpSpPr>
-      <p:sp>
-        <p:nvSpPr>
-          <p:cNvPr id="4" name="Rectangle 3">
+      <p:grpSp>
+        <p:nvGrpSpPr>
+          <p:cNvPr id="16" name="Group 15">
             <a:extLst>
               <a:ext uri="{FF2B5EF4-FFF2-40B4-BE49-F238E27FC236}">
-                <a16:creationId xmlns:a16="http://schemas.microsoft.com/office/drawing/2014/main" id="{EEDE017F-8F36-324A-B283-B56C127D376D}"/>
+                <a16:creationId xmlns:a16="http://schemas.microsoft.com/office/drawing/2014/main" id="{33BDD70A-7C2E-5F4B-8EB9-C8F05578B021}"/>
               </a:ext>
             </a:extLst>
           </p:cNvPr>
-          <p:cNvSpPr/>
+          <p:cNvGrpSpPr/>
           <p:nvPr/>
-        </p:nvSpPr>
-        <p:spPr>
+        </p:nvGrpSpPr>
+        <p:grpSpPr>
           <a:xfrm>
             <a:off x="-1" y="-1"/>
             <a:ext cx="10799763" cy="10799763"/>
+            <a:chOff x="-1" y="-1"/>
+            <a:chExt cx="10799763" cy="10799763"/>
           </a:xfrm>
-          <a:prstGeom prst="rect">
-            <a:avLst/>
-          </a:prstGeom>
-          <a:solidFill>
-            <a:srgbClr val="00C537"/>
-          </a:solidFill>
-          <a:ln>
-            <a:noFill/>
-          </a:ln>
-        </p:spPr>
-        <p:style>
-          <a:lnRef idx="2">
-            <a:schemeClr val="accent1">
-              <a:shade val="50000"/>
-            </a:schemeClr>
-          </a:lnRef>
-          <a:fillRef idx="1">
-            <a:schemeClr val="accent1"/>
-          </a:fillRef>
-          <a:effectRef idx="0">
-            <a:schemeClr val="accent1"/>
-          </a:effectRef>
-          <a:fontRef idx="minor">
-            <a:schemeClr val="lt1"/>
-          </a:fontRef>
-        </p:style>
-        <p:txBody>
-          <a:bodyPr wrap="none" bIns="1260000" rtlCol="0" anchor="b" anchorCtr="1"/>
-          <a:lstStyle/>
-          <a:p>
-            <a:pPr algn="ctr"/>
-            <a:r>
-              <a:rPr lang="en-US" sz="14400" dirty="0" err="1">
+        </p:grpSpPr>
+        <p:sp>
+          <p:nvSpPr>
+            <p:cNvPr id="4" name="Rectangle 3">
+              <a:extLst>
+                <a:ext uri="{FF2B5EF4-FFF2-40B4-BE49-F238E27FC236}">
+                  <a16:creationId xmlns:a16="http://schemas.microsoft.com/office/drawing/2014/main" id="{EEDE017F-8F36-324A-B283-B56C127D376D}"/>
+                </a:ext>
+              </a:extLst>
+            </p:cNvPr>
+            <p:cNvSpPr/>
+            <p:nvPr/>
+          </p:nvSpPr>
+          <p:spPr>
+            <a:xfrm>
+              <a:off x="-1" y="-1"/>
+              <a:ext cx="10799763" cy="10799763"/>
+            </a:xfrm>
+            <a:prstGeom prst="rect">
+              <a:avLst/>
+            </a:prstGeom>
+            <a:solidFill>
+              <a:srgbClr val="00C537"/>
+            </a:solidFill>
+            <a:ln>
+              <a:noFill/>
+            </a:ln>
+          </p:spPr>
+          <p:style>
+            <a:lnRef idx="2">
+              <a:schemeClr val="accent1">
+                <a:shade val="50000"/>
+              </a:schemeClr>
+            </a:lnRef>
+            <a:fillRef idx="1">
+              <a:schemeClr val="accent1"/>
+            </a:fillRef>
+            <a:effectRef idx="0">
+              <a:schemeClr val="accent1"/>
+            </a:effectRef>
+            <a:fontRef idx="minor">
+              <a:schemeClr val="lt1"/>
+            </a:fontRef>
+          </p:style>
+          <p:txBody>
+            <a:bodyPr wrap="none" bIns="1260000" rtlCol="0" anchor="b" anchorCtr="1"/>
+            <a:lstStyle/>
+            <a:p>
+              <a:pPr algn="ctr"/>
+              <a:r>
+                <a:rPr lang="en-US" sz="14400" dirty="0" err="1">
+                  <a:solidFill>
+                    <a:schemeClr val="tx1">
+                      <a:lumMod val="95000"/>
+                      <a:lumOff val="5000"/>
+                      <a:alpha val="89000"/>
+                    </a:schemeClr>
+                  </a:solidFill>
+                  <a:latin typeface="Exo 2" pitchFamily="2" charset="77"/>
+                </a:rPr>
+                <a:t>MedLog</a:t>
+              </a:r>
+              <a:endParaRPr lang="en-US" sz="14400" dirty="0">
                 <a:solidFill>
                   <a:schemeClr val="tx1">
                     <a:lumMod val="95000"/>
@@ -3024,156 +3056,145 @@
                   </a:schemeClr>
                 </a:solidFill>
                 <a:latin typeface="Exo 2" pitchFamily="2" charset="77"/>
-              </a:rPr>
-              <a:t>MedLog</a:t>
-            </a:r>
-            <a:endParaRPr lang="en-US" sz="14400" dirty="0">
-              <a:solidFill>
-                <a:schemeClr val="tx1">
-                  <a:lumMod val="95000"/>
-                  <a:lumOff val="5000"/>
-                  <a:alpha val="89000"/>
+              </a:endParaRPr>
+            </a:p>
+          </p:txBody>
+        </p:sp>
+        <p:pic>
+          <p:nvPicPr>
+            <p:cNvPr id="6" name="Picture 5" descr="A picture containing drawing&#10;&#10;Description automatically generated">
+              <a:extLst>
+                <a:ext uri="{FF2B5EF4-FFF2-40B4-BE49-F238E27FC236}">
+                  <a16:creationId xmlns:a16="http://schemas.microsoft.com/office/drawing/2014/main" id="{5038D2FC-BD02-5C40-9BB6-A98EF111D325}"/>
+                </a:ext>
+              </a:extLst>
+            </p:cNvPr>
+            <p:cNvPicPr>
+              <a:picLocks noChangeAspect="1"/>
+            </p:cNvPicPr>
+            <p:nvPr/>
+          </p:nvPicPr>
+          <p:blipFill>
+            <a:blip r:embed="rId2">
+              <a:alphaModFix amt="82000"/>
+            </a:blip>
+            <a:stretch>
+              <a:fillRect/>
+            </a:stretch>
+          </p:blipFill>
+          <p:spPr>
+            <a:xfrm>
+              <a:off x="955198" y="1036689"/>
+              <a:ext cx="4939806" cy="5401470"/>
+            </a:xfrm>
+            <a:prstGeom prst="rect">
+              <a:avLst/>
+            </a:prstGeom>
+          </p:spPr>
+        </p:pic>
+        <p:sp>
+          <p:nvSpPr>
+            <p:cNvPr id="7" name="Rectangle 6">
+              <a:extLst>
+                <a:ext uri="{FF2B5EF4-FFF2-40B4-BE49-F238E27FC236}">
+                  <a16:creationId xmlns:a16="http://schemas.microsoft.com/office/drawing/2014/main" id="{9B1799A2-270F-F548-B860-C6F92B256B93}"/>
+                </a:ext>
+              </a:extLst>
+            </p:cNvPr>
+            <p:cNvSpPr/>
+            <p:nvPr/>
+          </p:nvSpPr>
+          <p:spPr>
+            <a:xfrm>
+              <a:off x="3791451" y="4351726"/>
+              <a:ext cx="2211185" cy="2044931"/>
+            </a:xfrm>
+            <a:prstGeom prst="rect">
+              <a:avLst/>
+            </a:prstGeom>
+            <a:solidFill>
+              <a:srgbClr val="00C537"/>
+            </a:solidFill>
+            <a:ln>
+              <a:noFill/>
+            </a:ln>
+          </p:spPr>
+          <p:style>
+            <a:lnRef idx="2">
+              <a:schemeClr val="accent1">
+                <a:shade val="50000"/>
+              </a:schemeClr>
+            </a:lnRef>
+            <a:fillRef idx="1">
+              <a:schemeClr val="accent1"/>
+            </a:fillRef>
+            <a:effectRef idx="0">
+              <a:schemeClr val="accent1"/>
+            </a:effectRef>
+            <a:fontRef idx="minor">
+              <a:schemeClr val="lt1"/>
+            </a:fontRef>
+          </p:style>
+          <p:txBody>
+            <a:bodyPr rtlCol="0" anchor="ctr"/>
+            <a:lstStyle/>
+            <a:p>
+              <a:pPr algn="ctr"/>
+              <a:endParaRPr lang="en-US"/>
+            </a:p>
+          </p:txBody>
+        </p:sp>
+        <p:pic>
+          <p:nvPicPr>
+            <p:cNvPr id="15" name="Picture 14" descr="A close up of a logo&#10;&#10;Description automatically generated">
+              <a:extLst>
+                <a:ext uri="{FF2B5EF4-FFF2-40B4-BE49-F238E27FC236}">
+                  <a16:creationId xmlns:a16="http://schemas.microsoft.com/office/drawing/2014/main" id="{04ABE9C3-A9C0-5C48-8876-77D0CC7E16D5}"/>
+                </a:ext>
+              </a:extLst>
+            </p:cNvPr>
+            <p:cNvPicPr>
+              <a:picLocks noChangeAspect="1"/>
+            </p:cNvPicPr>
+            <p:nvPr/>
+          </p:nvPicPr>
+          <p:blipFill>
+            <a:blip r:embed="rId3">
+              <a:duotone>
+                <a:prstClr val="black"/>
+                <a:schemeClr val="accent3">
+                  <a:tint val="45000"/>
+                  <a:satMod val="400000"/>
                 </a:schemeClr>
-              </a:solidFill>
-              <a:latin typeface="Exo 2" pitchFamily="2" charset="77"/>
-            </a:endParaRPr>
-          </a:p>
-        </p:txBody>
-      </p:sp>
-      <p:pic>
-        <p:nvPicPr>
-          <p:cNvPr id="6" name="Picture 5" descr="A picture containing drawing&#10;&#10;Description automatically generated">
-            <a:extLst>
-              <a:ext uri="{FF2B5EF4-FFF2-40B4-BE49-F238E27FC236}">
-                <a16:creationId xmlns:a16="http://schemas.microsoft.com/office/drawing/2014/main" id="{5038D2FC-BD02-5C40-9BB6-A98EF111D325}"/>
-              </a:ext>
-            </a:extLst>
-          </p:cNvPr>
-          <p:cNvPicPr>
-            <a:picLocks noChangeAspect="1"/>
-          </p:cNvPicPr>
-          <p:nvPr/>
-        </p:nvPicPr>
-        <p:blipFill>
-          <a:blip r:embed="rId2">
-            <a:alphaModFix amt="82000"/>
-          </a:blip>
-          <a:stretch>
-            <a:fillRect/>
-          </a:stretch>
-        </p:blipFill>
-        <p:spPr>
-          <a:xfrm>
-            <a:off x="955198" y="1036689"/>
-            <a:ext cx="4939806" cy="5401470"/>
-          </a:xfrm>
-          <a:prstGeom prst="rect">
-            <a:avLst/>
-          </a:prstGeom>
-        </p:spPr>
-      </p:pic>
-      <p:sp>
-        <p:nvSpPr>
-          <p:cNvPr id="7" name="Rectangle 6">
-            <a:extLst>
-              <a:ext uri="{FF2B5EF4-FFF2-40B4-BE49-F238E27FC236}">
-                <a16:creationId xmlns:a16="http://schemas.microsoft.com/office/drawing/2014/main" id="{9B1799A2-270F-F548-B860-C6F92B256B93}"/>
-              </a:ext>
-            </a:extLst>
-          </p:cNvPr>
-          <p:cNvSpPr/>
-          <p:nvPr/>
-        </p:nvSpPr>
-        <p:spPr>
-          <a:xfrm>
-            <a:off x="3791451" y="4351726"/>
-            <a:ext cx="2211185" cy="2044931"/>
-          </a:xfrm>
-          <a:prstGeom prst="rect">
-            <a:avLst/>
-          </a:prstGeom>
-          <a:solidFill>
-            <a:srgbClr val="00C537"/>
-          </a:solidFill>
-          <a:ln>
-            <a:noFill/>
-          </a:ln>
-        </p:spPr>
-        <p:style>
-          <a:lnRef idx="2">
-            <a:schemeClr val="accent1">
-              <a:shade val="50000"/>
-            </a:schemeClr>
-          </a:lnRef>
-          <a:fillRef idx="1">
-            <a:schemeClr val="accent1"/>
-          </a:fillRef>
-          <a:effectRef idx="0">
-            <a:schemeClr val="accent1"/>
-          </a:effectRef>
-          <a:fontRef idx="minor">
-            <a:schemeClr val="lt1"/>
-          </a:fontRef>
-        </p:style>
-        <p:txBody>
-          <a:bodyPr rtlCol="0" anchor="ctr"/>
-          <a:lstStyle/>
-          <a:p>
-            <a:pPr algn="ctr"/>
-            <a:endParaRPr lang="en-US"/>
-          </a:p>
-        </p:txBody>
-      </p:sp>
-      <p:pic>
-        <p:nvPicPr>
-          <p:cNvPr id="15" name="Picture 14" descr="A close up of a logo&#10;&#10;Description automatically generated">
-            <a:extLst>
-              <a:ext uri="{FF2B5EF4-FFF2-40B4-BE49-F238E27FC236}">
-                <a16:creationId xmlns:a16="http://schemas.microsoft.com/office/drawing/2014/main" id="{04ABE9C3-A9C0-5C48-8876-77D0CC7E16D5}"/>
-              </a:ext>
-            </a:extLst>
-          </p:cNvPr>
-          <p:cNvPicPr>
-            <a:picLocks noChangeAspect="1"/>
-          </p:cNvPicPr>
-          <p:nvPr/>
-        </p:nvPicPr>
-        <p:blipFill>
-          <a:blip r:embed="rId3">
-            <a:duotone>
-              <a:prstClr val="black"/>
-              <a:schemeClr val="accent3">
-                <a:tint val="45000"/>
-                <a:satMod val="400000"/>
-              </a:schemeClr>
-            </a:duotone>
-            <a:alphaModFix amt="90000"/>
-            <a:extLst>
-              <a:ext uri="{BEBA8EAE-BF5A-486C-A8C5-ECC9F3942E4B}">
-                <a14:imgProps xmlns:a14="http://schemas.microsoft.com/office/drawing/2010/main">
-                  <a14:imgLayer r:embed="rId4">
-                    <a14:imgEffect>
-                      <a14:colorTemperature colorTemp="1500"/>
-                    </a14:imgEffect>
-                  </a14:imgLayer>
-                </a14:imgProps>
-              </a:ext>
-            </a:extLst>
-          </a:blip>
-          <a:stretch>
-            <a:fillRect/>
-          </a:stretch>
-        </p:blipFill>
-        <p:spPr>
-          <a:xfrm>
-            <a:off x="3608865" y="1222075"/>
-            <a:ext cx="6235700" cy="6235700"/>
-          </a:xfrm>
-          <a:prstGeom prst="rect">
-            <a:avLst/>
-          </a:prstGeom>
-        </p:spPr>
-      </p:pic>
+              </a:duotone>
+              <a:alphaModFix amt="90000"/>
+              <a:extLst>
+                <a:ext uri="{BEBA8EAE-BF5A-486C-A8C5-ECC9F3942E4B}">
+                  <a14:imgProps xmlns:a14="http://schemas.microsoft.com/office/drawing/2010/main">
+                    <a14:imgLayer r:embed="rId4">
+                      <a14:imgEffect>
+                        <a14:colorTemperature colorTemp="1500"/>
+                      </a14:imgEffect>
+                    </a14:imgLayer>
+                  </a14:imgProps>
+                </a:ext>
+              </a:extLst>
+            </a:blip>
+            <a:stretch>
+              <a:fillRect/>
+            </a:stretch>
+          </p:blipFill>
+          <p:spPr>
+            <a:xfrm>
+              <a:off x="3608865" y="1222075"/>
+              <a:ext cx="6235700" cy="6235700"/>
+            </a:xfrm>
+            <a:prstGeom prst="rect">
+              <a:avLst/>
+            </a:prstGeom>
+          </p:spPr>
+        </p:pic>
+      </p:grpSp>
     </p:spTree>
     <p:extLst>
       <p:ext uri="{BB962C8B-B14F-4D97-AF65-F5344CB8AC3E}">

</xml_diff>